<commit_message>
[PRESENTATION] - Update Slides
</commit_message>
<xml_diff>
--- a/Testes - Semana de qualidade.pptx
+++ b/Testes - Semana de qualidade.pptx
@@ -12253,6 +12253,13 @@
   <p:clrMapOvr>
     <a:masterClrMapping/>
   </p:clrMapOvr>
+  <p:timing>
+    <p:tnLst>
+      <p:par>
+        <p:cTn id="1" dur="indefinite" restart="never" nodeType="tmRoot"/>
+      </p:par>
+    </p:tnLst>
+  </p:timing>
 </p:sld>
 </file>
 
@@ -12720,7 +12727,7 @@
           <p:cNvPr id="2" name="Google Shape;285;p32">
             <a:extLst>
               <a:ext uri="{FF2B5EF4-FFF2-40B4-BE49-F238E27FC236}">
-                <a16:creationId xmlns:a16="http://schemas.microsoft.com/office/drawing/2014/main" xmlns="" id="{F4EBB00D-9EB7-44EF-725D-102C98FAC7EF}"/>
+                <a16:creationId xmlns="" xmlns:a16="http://schemas.microsoft.com/office/drawing/2014/main" id="{F4EBB00D-9EB7-44EF-725D-102C98FAC7EF}"/>
               </a:ext>
             </a:extLst>
           </p:cNvPr>
@@ -13035,6 +13042,13 @@
   <p:clrMapOvr>
     <a:masterClrMapping/>
   </p:clrMapOvr>
+  <p:timing>
+    <p:tnLst>
+      <p:par>
+        <p:cTn id="1" dur="indefinite" restart="never" nodeType="tmRoot"/>
+      </p:par>
+    </p:tnLst>
+  </p:timing>
 </p:sld>
 </file>
 
@@ -13502,7 +13516,7 @@
           <p:cNvPr id="2" name="Google Shape;285;p32">
             <a:extLst>
               <a:ext uri="{FF2B5EF4-FFF2-40B4-BE49-F238E27FC236}">
-                <a16:creationId xmlns:a16="http://schemas.microsoft.com/office/drawing/2014/main" xmlns="" id="{F4EBB00D-9EB7-44EF-725D-102C98FAC7EF}"/>
+                <a16:creationId xmlns="" xmlns:a16="http://schemas.microsoft.com/office/drawing/2014/main" id="{F4EBB00D-9EB7-44EF-725D-102C98FAC7EF}"/>
               </a:ext>
             </a:extLst>
           </p:cNvPr>
@@ -13829,6 +13843,13 @@
   <p:clrMapOvr>
     <a:masterClrMapping/>
   </p:clrMapOvr>
+  <p:timing>
+    <p:tnLst>
+      <p:par>
+        <p:cTn id="1" dur="indefinite" restart="never" nodeType="tmRoot"/>
+      </p:par>
+    </p:tnLst>
+  </p:timing>
 </p:sld>
 </file>
 
@@ -14296,7 +14317,7 @@
           <p:cNvPr id="2" name="Google Shape;285;p32">
             <a:extLst>
               <a:ext uri="{FF2B5EF4-FFF2-40B4-BE49-F238E27FC236}">
-                <a16:creationId xmlns:a16="http://schemas.microsoft.com/office/drawing/2014/main" xmlns="" id="{F4EBB00D-9EB7-44EF-725D-102C98FAC7EF}"/>
+                <a16:creationId xmlns="" xmlns:a16="http://schemas.microsoft.com/office/drawing/2014/main" id="{F4EBB00D-9EB7-44EF-725D-102C98FAC7EF}"/>
               </a:ext>
             </a:extLst>
           </p:cNvPr>
@@ -14611,6 +14632,13 @@
   <p:clrMapOvr>
     <a:masterClrMapping/>
   </p:clrMapOvr>
+  <p:timing>
+    <p:tnLst>
+      <p:par>
+        <p:cTn id="1" dur="indefinite" restart="never" nodeType="tmRoot"/>
+      </p:par>
+    </p:tnLst>
+  </p:timing>
 </p:sld>
 </file>
 
@@ -15078,7 +15106,7 @@
           <p:cNvPr id="2" name="Google Shape;285;p32">
             <a:extLst>
               <a:ext uri="{FF2B5EF4-FFF2-40B4-BE49-F238E27FC236}">
-                <a16:creationId xmlns:a16="http://schemas.microsoft.com/office/drawing/2014/main" xmlns="" id="{F4EBB00D-9EB7-44EF-725D-102C98FAC7EF}"/>
+                <a16:creationId xmlns="" xmlns:a16="http://schemas.microsoft.com/office/drawing/2014/main" id="{F4EBB00D-9EB7-44EF-725D-102C98FAC7EF}"/>
               </a:ext>
             </a:extLst>
           </p:cNvPr>
@@ -15388,7 +15416,7 @@
           <p:cNvPr id="3" name="Google Shape;285;p32">
             <a:extLst>
               <a:ext uri="{FF2B5EF4-FFF2-40B4-BE49-F238E27FC236}">
-                <a16:creationId xmlns:a16="http://schemas.microsoft.com/office/drawing/2014/main" xmlns="" id="{FCFAD74F-C434-3A06-E9EE-DDA42FB65283}"/>
+                <a16:creationId xmlns="" xmlns:a16="http://schemas.microsoft.com/office/drawing/2014/main" id="{FCFAD74F-C434-3A06-E9EE-DDA42FB65283}"/>
               </a:ext>
             </a:extLst>
           </p:cNvPr>
@@ -16515,11 +16543,7 @@
             </a:r>
             <a:r>
               <a:rPr lang="en" dirty="0"/>
-              <a:t>Exemplos </a:t>
-            </a:r>
-            <a:r>
-              <a:rPr lang="en" dirty="0"/>
-              <a:t>– </a:t>
+              <a:t>Exemplos – </a:t>
             </a:r>
             <a:r>
               <a:rPr lang="en" dirty="0" smtClean="0"/>
@@ -22546,7 +22570,7 @@
           <p:cNvPr id="3" name="CaixaDeTexto 2">
             <a:extLst>
               <a:ext uri="{FF2B5EF4-FFF2-40B4-BE49-F238E27FC236}">
-                <a16:creationId xmlns:a16="http://schemas.microsoft.com/office/drawing/2014/main" xmlns="" id="{309B08B6-9145-B3D6-2411-56E137E90BFF}"/>
+                <a16:creationId xmlns="" xmlns:a16="http://schemas.microsoft.com/office/drawing/2014/main" id="{309B08B6-9145-B3D6-2411-56E137E90BFF}"/>
               </a:ext>
             </a:extLst>
           </p:cNvPr>
@@ -22756,27 +22780,37 @@
           </a:p>
           <a:p>
             <a:r>
-              <a:rPr lang="en" dirty="0">
+              <a:rPr lang="en">
                 <a:solidFill>
                   <a:schemeClr val="accent2"/>
                 </a:solidFill>
                 <a:latin typeface="+mj-lt"/>
                 <a:sym typeface="Quantico"/>
               </a:rPr>
-              <a:t>@Before</a:t>
-            </a:r>
-            <a:r>
-              <a:rPr lang="en" dirty="0">
-                <a:solidFill>
-                  <a:schemeClr val="tx1"/>
+              <a:t>@</a:t>
+            </a:r>
+            <a:r>
+              <a:rPr lang="en" smtClean="0">
+                <a:solidFill>
+                  <a:schemeClr val="accent2"/>
                 </a:solidFill>
                 <a:latin typeface="+mj-lt"/>
                 <a:sym typeface="Quantico"/>
               </a:rPr>
-              <a:t>/</a:t>
-            </a:r>
-            <a:r>
-              <a:rPr lang="en" dirty="0">
+              <a:t>Before </a:t>
+            </a:r>
+            <a:r>
+              <a:rPr lang="en" smtClean="0">
+                <a:solidFill>
+                  <a:schemeClr val="tx1"/>
+                </a:solidFill>
+                <a:latin typeface="+mj-lt"/>
+                <a:sym typeface="Quantico"/>
+              </a:rPr>
+              <a:t>/ </a:t>
+            </a:r>
+            <a:r>
+              <a:rPr lang="en" smtClean="0">
                 <a:solidFill>
                   <a:schemeClr val="accent2"/>
                 </a:solidFill>
@@ -22824,6 +22858,13 @@
   <p:clrMapOvr>
     <a:masterClrMapping/>
   </p:clrMapOvr>
+  <p:timing>
+    <p:tnLst>
+      <p:par>
+        <p:cTn id="1" dur="indefinite" restart="never" nodeType="tmRoot"/>
+      </p:par>
+    </p:tnLst>
+  </p:timing>
 </p:sld>
 </file>
 
@@ -23312,6 +23353,13 @@
   <p:clrMapOvr>
     <a:masterClrMapping/>
   </p:clrMapOvr>
+  <p:timing>
+    <p:tnLst>
+      <p:par>
+        <p:cTn id="1" dur="indefinite" restart="never" nodeType="tmRoot"/>
+      </p:par>
+    </p:tnLst>
+  </p:timing>
 </p:sld>
 </file>
 
@@ -23554,6 +23602,13 @@
   <p:clrMapOvr>
     <a:masterClrMapping/>
   </p:clrMapOvr>
+  <p:timing>
+    <p:tnLst>
+      <p:par>
+        <p:cTn id="1" dur="indefinite" restart="never" nodeType="tmRoot"/>
+      </p:par>
+    </p:tnLst>
+  </p:timing>
 </p:sld>
 </file>
 
@@ -25361,6 +25416,13 @@
   <p:clrMapOvr>
     <a:masterClrMapping/>
   </p:clrMapOvr>
+  <p:timing>
+    <p:tnLst>
+      <p:par>
+        <p:cTn id="1" dur="indefinite" restart="never" nodeType="tmRoot"/>
+      </p:par>
+    </p:tnLst>
+  </p:timing>
 </p:sld>
 </file>
 
@@ -25865,7 +25927,7 @@
           <p:cNvPr id="2" name="CaixaDeTexto 1">
             <a:extLst>
               <a:ext uri="{FF2B5EF4-FFF2-40B4-BE49-F238E27FC236}">
-                <a16:creationId xmlns:a16="http://schemas.microsoft.com/office/drawing/2014/main" xmlns="" id="{CDE52CDB-4CC3-FB46-3674-3437E0750BF4}"/>
+                <a16:creationId xmlns="" xmlns:a16="http://schemas.microsoft.com/office/drawing/2014/main" id="{CDE52CDB-4CC3-FB46-3674-3437E0750BF4}"/>
               </a:ext>
             </a:extLst>
           </p:cNvPr>
@@ -25934,31 +25996,7 @@
                 <a:cs typeface="Quantico"/>
                 <a:sym typeface="Quantico"/>
               </a:rPr>
-              <a:t>“https</a:t>
-            </a:r>
-            <a:r>
-              <a:rPr lang="pt-BR" dirty="0" smtClean="0">
-                <a:solidFill>
-                  <a:schemeClr val="tx2"/>
-                </a:solidFill>
-                <a:latin typeface="+mj-lt"/>
-                <a:ea typeface="Quantico"/>
-                <a:cs typeface="Quantico"/>
-                <a:sym typeface="Quantico"/>
-              </a:rPr>
-              <a:t>://santocodigo.com.br</a:t>
-            </a:r>
-            <a:r>
-              <a:rPr lang="pt-BR" dirty="0" smtClean="0">
-                <a:solidFill>
-                  <a:schemeClr val="tx2"/>
-                </a:solidFill>
-                <a:latin typeface="+mj-lt"/>
-                <a:ea typeface="Quantico"/>
-                <a:cs typeface="Quantico"/>
-                <a:sym typeface="Quantico"/>
-              </a:rPr>
-              <a:t>”</a:t>
+              <a:t>“https://santocodigo.com.br”</a:t>
             </a:r>
             <a:r>
               <a:rPr lang="pt-BR" dirty="0" smtClean="0">
@@ -31581,6 +31619,13 @@
   <p:clrMapOvr>
     <a:masterClrMapping/>
   </p:clrMapOvr>
+  <p:timing>
+    <p:tnLst>
+      <p:par>
+        <p:cTn id="1" dur="indefinite" restart="never" nodeType="tmRoot"/>
+      </p:par>
+    </p:tnLst>
+  </p:timing>
 </p:sld>
 </file>
 
@@ -32139,6 +32184,13 @@
   <p:clrMapOvr>
     <a:masterClrMapping/>
   </p:clrMapOvr>
+  <p:timing>
+    <p:tnLst>
+      <p:par>
+        <p:cTn id="1" dur="indefinite" restart="never" nodeType="tmRoot"/>
+      </p:par>
+    </p:tnLst>
+  </p:timing>
 </p:sld>
 </file>
 
@@ -32543,6 +32595,13 @@
   <p:clrMapOvr>
     <a:masterClrMapping/>
   </p:clrMapOvr>
+  <p:timing>
+    <p:tnLst>
+      <p:par>
+        <p:cTn id="1" dur="indefinite" restart="never" nodeType="tmRoot"/>
+      </p:par>
+    </p:tnLst>
+  </p:timing>
 </p:sld>
 </file>
 
@@ -32947,6 +33006,13 @@
   <p:clrMapOvr>
     <a:masterClrMapping/>
   </p:clrMapOvr>
+  <p:timing>
+    <p:tnLst>
+      <p:par>
+        <p:cTn id="1" dur="indefinite" restart="never" nodeType="tmRoot"/>
+      </p:par>
+    </p:tnLst>
+  </p:timing>
 </p:sld>
 </file>
 
@@ -33036,7 +33102,7 @@
         <p:spPr>
           <a:xfrm>
             <a:off x="719987" y="2359379"/>
-            <a:ext cx="7704001" cy="665176"/>
+            <a:ext cx="7763995" cy="665176"/>
           </a:xfrm>
           <a:prstGeom prst="rect">
             <a:avLst/>
@@ -33066,7 +33132,11 @@
             </a:br>
             <a:r>
               <a:rPr lang="en" dirty="0"/>
-              <a:t>   mesmo que o projeto/classe não tenha nenhum teste.</a:t>
+              <a:t>   mesmo </a:t>
+            </a:r>
+            <a:r>
+              <a:rPr lang="en" dirty="0" smtClean="0"/>
+              <a:t>que não exista nenhum teste no projeto/classe.</a:t>
             </a:r>
             <a:endParaRPr dirty="0"/>
           </a:p>
@@ -33468,6 +33538,13 @@
   <p:clrMapOvr>
     <a:masterClrMapping/>
   </p:clrMapOvr>
+  <p:timing>
+    <p:tnLst>
+      <p:par>
+        <p:cTn id="1" dur="indefinite" restart="never" nodeType="tmRoot"/>
+      </p:par>
+    </p:tnLst>
+  </p:timing>
 </p:sld>
 </file>
 
@@ -33526,20 +33603,28 @@
               <a:t>* </a:t>
             </a:r>
             <a:r>
+              <a:rPr lang="pt-BR" sz="2200" dirty="0" smtClean="0">
+                <a:latin typeface="Quantico"/>
+                <a:ea typeface="Quantico"/>
+                <a:cs typeface="Quantico"/>
+              </a:rPr>
+              <a:t>Crie Test </a:t>
+            </a:r>
+            <a:r>
               <a:rPr lang="pt-BR" sz="2200" dirty="0">
                 <a:latin typeface="Quantico"/>
                 <a:ea typeface="Quantico"/>
                 <a:cs typeface="Quantico"/>
               </a:rPr>
-              <a:t>Test Data </a:t>
-            </a:r>
-            <a:r>
-              <a:rPr lang="pt-BR" sz="2200" dirty="0" err="1">
+              <a:t>Data </a:t>
+            </a:r>
+            <a:r>
+              <a:rPr lang="pt-BR" sz="2200" dirty="0" err="1" smtClean="0">
                 <a:latin typeface="Quantico"/>
                 <a:ea typeface="Quantico"/>
                 <a:cs typeface="Quantico"/>
               </a:rPr>
-              <a:t>Builder</a:t>
+              <a:t>Builders</a:t>
             </a:r>
             <a:endParaRPr lang="pt-BR" sz="2200" dirty="0">
               <a:latin typeface="Quantico"/>
@@ -34006,6 +34091,13 @@
   <p:clrMapOvr>
     <a:masterClrMapping/>
   </p:clrMapOvr>
+  <p:timing>
+    <p:tnLst>
+      <p:par>
+        <p:cTn id="1" dur="indefinite" restart="never" nodeType="tmRoot"/>
+      </p:par>
+    </p:tnLst>
+  </p:timing>
 </p:sld>
 </file>
 
@@ -34745,6 +34837,13 @@
   <p:clrMapOvr>
     <a:masterClrMapping/>
   </p:clrMapOvr>
+  <p:timing>
+    <p:tnLst>
+      <p:par>
+        <p:cTn id="1" dur="indefinite" restart="never" nodeType="tmRoot"/>
+      </p:par>
+    </p:tnLst>
+  </p:timing>
 </p:sld>
 </file>
 

</xml_diff>